<commit_message>
Er stond een gedupliceerde slide in!
</commit_message>
<xml_diff>
--- a/Presentatie/EMPTYBACKPACK 1.pptx
+++ b/Presentatie/EMPTYBACKPACK 1.pptx
@@ -5,7 +5,7 @@
     <p:sldMasterId id="2147483648" r:id="rId1"/>
   </p:sldMasterIdLst>
   <p:notesMasterIdLst>
-    <p:notesMasterId r:id="rId12"/>
+    <p:notesMasterId r:id="rId11"/>
   </p:notesMasterIdLst>
   <p:sldIdLst>
     <p:sldId id="256" r:id="rId2"/>
@@ -13,11 +13,10 @@
     <p:sldId id="262" r:id="rId4"/>
     <p:sldId id="259" r:id="rId5"/>
     <p:sldId id="260" r:id="rId6"/>
-    <p:sldId id="266" r:id="rId7"/>
-    <p:sldId id="261" r:id="rId8"/>
-    <p:sldId id="263" r:id="rId9"/>
-    <p:sldId id="264" r:id="rId10"/>
-    <p:sldId id="265" r:id="rId11"/>
+    <p:sldId id="261" r:id="rId7"/>
+    <p:sldId id="263" r:id="rId8"/>
+    <p:sldId id="264" r:id="rId9"/>
+    <p:sldId id="265" r:id="rId10"/>
   </p:sldIdLst>
   <p:sldSz cx="12192000" cy="6858000"/>
   <p:notesSz cx="6858000" cy="9144000"/>
@@ -116,6 +115,22 @@
       </a:defRPr>
     </a:lvl9pPr>
   </p:defaultTextStyle>
+  <p:extLst>
+    <p:ext uri="{EFAFB233-063F-42B5-8137-9DF3F51BA10A}">
+      <p15:sldGuideLst xmlns:p15="http://schemas.microsoft.com/office/powerpoint/2012/main">
+        <p15:guide id="1" orient="horz" pos="2160">
+          <p15:clr>
+            <a:srgbClr val="A4A3A4"/>
+          </p15:clr>
+        </p15:guide>
+        <p15:guide id="2" pos="3840">
+          <p15:clr>
+            <a:srgbClr val="A4A3A4"/>
+          </p15:clr>
+        </p15:guide>
+      </p15:sldGuideLst>
+    </p:ext>
+  </p:extLst>
 </p:presentation>
 </file>
 
@@ -201,7 +216,7 @@
           <a:p>
             <a:fld id="{6637A5B2-7BCB-446E-8667-8C1A473D2952}" type="datetimeFigureOut">
               <a:rPr lang="nl-NL" smtClean="0"/>
-              <a:t>26-3-2013</a:t>
+              <a:t>27-3-2013</a:t>
             </a:fld>
             <a:endParaRPr lang="nl-NL"/>
           </a:p>
@@ -534,7 +549,7 @@
           <a:p>
             <a:fld id="{B6035F80-FEF7-46E5-BED8-0CB32BFD9625}" type="slidenum">
               <a:rPr lang="nl-NL" smtClean="0"/>
-              <a:t>8</a:t>
+              <a:t>7</a:t>
             </a:fld>
             <a:endParaRPr lang="nl-NL"/>
           </a:p>
@@ -739,7 +754,7 @@
           <a:p>
             <a:fld id="{418A5621-5BC2-4291-99F6-0B6820EEA717}" type="datetime1">
               <a:rPr lang="en-US" smtClean="0"/>
-              <a:t>3/26/2013</a:t>
+              <a:t>3/27/2013</a:t>
             </a:fld>
             <a:endParaRPr lang="en-US" dirty="0"/>
           </a:p>
@@ -1009,7 +1024,7 @@
           <a:p>
             <a:fld id="{D07217A5-94C3-4281-9904-C29ABDCCD10F}" type="datetime1">
               <a:rPr lang="en-US" smtClean="0"/>
-              <a:t>3/26/2013</a:t>
+              <a:t>3/27/2013</a:t>
             </a:fld>
             <a:endParaRPr lang="en-US" dirty="0"/>
           </a:p>
@@ -1198,7 +1213,7 @@
           <a:p>
             <a:fld id="{618109B7-AD69-4D4D-AA66-E2ED838E2544}" type="datetime1">
               <a:rPr lang="en-US" smtClean="0"/>
-              <a:t>3/26/2013</a:t>
+              <a:t>3/27/2013</a:t>
             </a:fld>
             <a:endParaRPr lang="en-US" dirty="0"/>
           </a:p>
@@ -1466,7 +1481,7 @@
           <a:p>
             <a:fld id="{9EF6F3B5-9745-4E23-A65A-363B14D3F8EC}" type="datetime1">
               <a:rPr lang="en-US" smtClean="0"/>
-              <a:t>3/26/2013</a:t>
+              <a:t>3/27/2013</a:t>
             </a:fld>
             <a:endParaRPr lang="en-US" dirty="0"/>
           </a:p>
@@ -1802,7 +1817,7 @@
           <a:p>
             <a:fld id="{085EFAD6-FF2B-4BFD-9BF7-5C3E2134BD8A}" type="datetime1">
               <a:rPr lang="en-US" smtClean="0"/>
-              <a:t>3/26/2013</a:t>
+              <a:t>3/27/2013</a:t>
             </a:fld>
             <a:endParaRPr lang="en-US" dirty="0"/>
           </a:p>
@@ -2420,7 +2435,7 @@
           <a:p>
             <a:fld id="{5C1946B7-FF1C-4ABB-B66B-32EE153E8C12}" type="datetime1">
               <a:rPr lang="en-US" smtClean="0"/>
-              <a:t>3/26/2013</a:t>
+              <a:t>3/27/2013</a:t>
             </a:fld>
             <a:endParaRPr lang="en-US" dirty="0"/>
           </a:p>
@@ -3275,7 +3290,7 @@
           <a:p>
             <a:fld id="{2BFEDA6F-AD93-4A46-8B3A-78071368C923}" type="datetime1">
               <a:rPr lang="en-US" smtClean="0"/>
-              <a:t>3/26/2013</a:t>
+              <a:t>3/27/2013</a:t>
             </a:fld>
             <a:endParaRPr lang="en-US" dirty="0"/>
           </a:p>
@@ -3440,7 +3455,7 @@
           <a:p>
             <a:fld id="{B4A54A66-77C5-4468-83CA-8C23C6A7E155}" type="datetime1">
               <a:rPr lang="en-US" smtClean="0"/>
-              <a:t>3/26/2013</a:t>
+              <a:t>3/27/2013</a:t>
             </a:fld>
             <a:endParaRPr lang="en-US" dirty="0"/>
           </a:p>
@@ -3615,7 +3630,7 @@
           <a:p>
             <a:fld id="{D89B7816-E5F7-4316-9751-098EFD35C3B2}" type="datetime1">
               <a:rPr lang="en-US" smtClean="0"/>
-              <a:t>3/26/2013</a:t>
+              <a:t>3/27/2013</a:t>
             </a:fld>
             <a:endParaRPr lang="en-US" dirty="0"/>
           </a:p>
@@ -3780,7 +3795,7 @@
           <a:p>
             <a:fld id="{38E3CB6B-0482-4B61-9804-55CEF59A18AB}" type="datetime1">
               <a:rPr lang="en-US" smtClean="0"/>
-              <a:t>3/26/2013</a:t>
+              <a:t>3/27/2013</a:t>
             </a:fld>
             <a:endParaRPr lang="en-US" dirty="0"/>
           </a:p>
@@ -4022,7 +4037,7 @@
           <a:p>
             <a:fld id="{2675BBB3-0B82-4F3F-9ADB-956B36A4C8C6}" type="datetime1">
               <a:rPr lang="en-US" smtClean="0"/>
-              <a:t>3/26/2013</a:t>
+              <a:t>3/27/2013</a:t>
             </a:fld>
             <a:endParaRPr lang="en-US" dirty="0"/>
           </a:p>
@@ -4309,7 +4324,7 @@
           <a:p>
             <a:fld id="{6D47433A-12E8-40D4-8C0A-D25A1882B41A}" type="datetime1">
               <a:rPr lang="en-US" smtClean="0"/>
-              <a:t>3/26/2013</a:t>
+              <a:t>3/27/2013</a:t>
             </a:fld>
             <a:endParaRPr lang="en-US" dirty="0"/>
           </a:p>
@@ -4748,7 +4763,7 @@
           <a:p>
             <a:fld id="{C7C333B1-D01C-44D5-AC5F-45B49ECB6EE3}" type="datetime1">
               <a:rPr lang="en-US" smtClean="0"/>
-              <a:t>3/26/2013</a:t>
+              <a:t>3/27/2013</a:t>
             </a:fld>
             <a:endParaRPr lang="en-US" dirty="0"/>
           </a:p>
@@ -4861,7 +4876,7 @@
           <a:p>
             <a:fld id="{AD1BE344-A4D0-493E-8DD9-F63C6C6D7129}" type="datetime1">
               <a:rPr lang="en-US" smtClean="0"/>
-              <a:t>3/26/2013</a:t>
+              <a:t>3/27/2013</a:t>
             </a:fld>
             <a:endParaRPr lang="en-US" dirty="0"/>
           </a:p>
@@ -4951,7 +4966,7 @@
           <a:p>
             <a:fld id="{9F9E0EB7-3545-4193-BD26-FE552D1184FD}" type="datetime1">
               <a:rPr lang="en-US" smtClean="0"/>
-              <a:t>3/26/2013</a:t>
+              <a:t>3/27/2013</a:t>
             </a:fld>
             <a:endParaRPr lang="en-US" dirty="0"/>
           </a:p>
@@ -5225,7 +5240,7 @@
           <a:p>
             <a:fld id="{A56E9BBF-B715-4AFD-9A22-C9FF5E5E3602}" type="datetime1">
               <a:rPr lang="en-US" smtClean="0"/>
-              <a:t>3/26/2013</a:t>
+              <a:t>3/27/2013</a:t>
             </a:fld>
             <a:endParaRPr lang="en-US" dirty="0"/>
           </a:p>
@@ -5495,7 +5510,7 @@
           <a:p>
             <a:fld id="{117D7603-2832-435E-92BD-ED85221D87D2}" type="datetime1">
               <a:rPr lang="en-US" smtClean="0"/>
-              <a:t>3/26/2013</a:t>
+              <a:t>3/27/2013</a:t>
             </a:fld>
             <a:endParaRPr lang="en-US" dirty="0"/>
           </a:p>
@@ -5919,7 +5934,7 @@
           <a:p>
             <a:fld id="{757C46E7-85B3-4766-9A25-E2627FE47B68}" type="datetime1">
               <a:rPr lang="en-US" smtClean="0"/>
-              <a:t>3/26/2013</a:t>
+              <a:t>3/27/2013</a:t>
             </a:fld>
             <a:endParaRPr lang="en-US" dirty="0"/>
           </a:p>
@@ -6532,113 +6547,6 @@
 </p:sld>
 </file>
 
-<file path=ppt/slides/slide10.xml><?xml version="1.0" encoding="utf-8"?>
-<p:sld xmlns:a="http://schemas.openxmlformats.org/drawingml/2006/main" xmlns:r="http://schemas.openxmlformats.org/officeDocument/2006/relationships" xmlns:p="http://schemas.openxmlformats.org/presentationml/2006/main">
-  <p:cSld>
-    <p:spTree>
-      <p:nvGrpSpPr>
-        <p:cNvPr id="1" name=""/>
-        <p:cNvGrpSpPr/>
-        <p:nvPr/>
-      </p:nvGrpSpPr>
-      <p:grpSpPr>
-        <a:xfrm>
-          <a:off x="0" y="0"/>
-          <a:ext cx="0" cy="0"/>
-          <a:chOff x="0" y="0"/>
-          <a:chExt cx="0" cy="0"/>
-        </a:xfrm>
-      </p:grpSpPr>
-      <p:sp>
-        <p:nvSpPr>
-          <p:cNvPr id="2" name="Title 1"/>
-          <p:cNvSpPr>
-            <a:spLocks noGrp="1"/>
-          </p:cNvSpPr>
-          <p:nvPr>
-            <p:ph type="title"/>
-          </p:nvPr>
-        </p:nvSpPr>
-        <p:spPr/>
-        <p:txBody>
-          <a:bodyPr/>
-          <a:lstStyle/>
-          <a:p>
-            <a:r>
-              <a:rPr lang="nl-NL" dirty="0" smtClean="0"/>
-              <a:t>CONCLUSIE</a:t>
-            </a:r>
-            <a:endParaRPr lang="nl-NL" dirty="0"/>
-          </a:p>
-        </p:txBody>
-      </p:sp>
-      <p:sp>
-        <p:nvSpPr>
-          <p:cNvPr id="7" name="Text Placeholder 6"/>
-          <p:cNvSpPr>
-            <a:spLocks noGrp="1"/>
-          </p:cNvSpPr>
-          <p:nvPr>
-            <p:ph type="body" sz="half" idx="2"/>
-          </p:nvPr>
-        </p:nvSpPr>
-        <p:spPr/>
-        <p:txBody>
-          <a:bodyPr>
-            <a:normAutofit/>
-          </a:bodyPr>
-          <a:lstStyle/>
-          <a:p>
-            <a:endParaRPr lang="nl-NL" sz="2400" i="1" dirty="0" smtClean="0"/>
-          </a:p>
-          <a:p>
-            <a:endParaRPr lang="nl-NL" sz="2400" i="1" dirty="0"/>
-          </a:p>
-        </p:txBody>
-      </p:sp>
-      <p:sp>
-        <p:nvSpPr>
-          <p:cNvPr id="4" name="Slide Number Placeholder 3"/>
-          <p:cNvSpPr>
-            <a:spLocks noGrp="1"/>
-          </p:cNvSpPr>
-          <p:nvPr>
-            <p:ph type="sldNum" sz="quarter" idx="12"/>
-          </p:nvPr>
-        </p:nvSpPr>
-        <p:spPr/>
-        <p:txBody>
-          <a:bodyPr/>
-          <a:lstStyle/>
-          <a:p>
-            <a:fld id="{D57F1E4F-1CFF-5643-939E-02111984F565}" type="slidenum">
-              <a:rPr lang="en-US" smtClean="0"/>
-              <a:t>10</a:t>
-            </a:fld>
-            <a:endParaRPr lang="en-US" dirty="0"/>
-          </a:p>
-        </p:txBody>
-      </p:sp>
-    </p:spTree>
-    <p:extLst>
-      <p:ext uri="{BB962C8B-B14F-4D97-AF65-F5344CB8AC3E}">
-        <p14:creationId xmlns:p14="http://schemas.microsoft.com/office/powerpoint/2010/main" val="3282580397"/>
-      </p:ext>
-    </p:extLst>
-  </p:cSld>
-  <p:clrMapOvr>
-    <a:masterClrMapping/>
-  </p:clrMapOvr>
-  <p:timing>
-    <p:tnLst>
-      <p:par>
-        <p:cTn id="1" dur="indefinite" restart="never" nodeType="tmRoot"/>
-      </p:par>
-    </p:tnLst>
-  </p:timing>
-</p:sld>
-</file>
-
 <file path=ppt/slides/slide2.xml><?xml version="1.0" encoding="utf-8"?>
 <p:sld xmlns:a="http://schemas.openxmlformats.org/drawingml/2006/main" xmlns:r="http://schemas.openxmlformats.org/officeDocument/2006/relationships" xmlns:p="http://schemas.openxmlformats.org/presentationml/2006/main">
   <p:cSld>
@@ -7248,122 +7156,6 @@
       </p:grpSpPr>
       <p:sp>
         <p:nvSpPr>
-          <p:cNvPr id="4" name="Title 3"/>
-          <p:cNvSpPr>
-            <a:spLocks noGrp="1"/>
-          </p:cNvSpPr>
-          <p:nvPr>
-            <p:ph type="title"/>
-          </p:nvPr>
-        </p:nvSpPr>
-        <p:spPr>
-          <a:xfrm>
-            <a:off x="1170859" y="1597476"/>
-            <a:ext cx="8825657" cy="1915647"/>
-          </a:xfrm>
-        </p:spPr>
-        <p:txBody>
-          <a:bodyPr/>
-          <a:lstStyle/>
-          <a:p>
-            <a:r>
-              <a:rPr lang="nl-NL" dirty="0" smtClean="0"/>
-              <a:t>PRODUCT</a:t>
-            </a:r>
-            <a:endParaRPr lang="nl-NL" dirty="0"/>
-          </a:p>
-        </p:txBody>
-      </p:sp>
-      <p:sp>
-        <p:nvSpPr>
-          <p:cNvPr id="5" name="Text Placeholder 4"/>
-          <p:cNvSpPr>
-            <a:spLocks noGrp="1"/>
-          </p:cNvSpPr>
-          <p:nvPr>
-            <p:ph type="body" idx="1"/>
-          </p:nvPr>
-        </p:nvSpPr>
-        <p:spPr>
-          <a:xfrm>
-            <a:off x="1170858" y="3513124"/>
-            <a:ext cx="8825658" cy="860400"/>
-          </a:xfrm>
-        </p:spPr>
-        <p:txBody>
-          <a:bodyPr/>
-          <a:lstStyle/>
-          <a:p>
-            <a:r>
-              <a:rPr lang="nl-NL" dirty="0" smtClean="0"/>
-              <a:t>UML DIAGRAMMEN – REQUIREMENTS – DB ONTWERP</a:t>
-            </a:r>
-            <a:endParaRPr lang="nl-NL" dirty="0"/>
-          </a:p>
-        </p:txBody>
-      </p:sp>
-      <p:sp>
-        <p:nvSpPr>
-          <p:cNvPr id="6" name="Slide Number Placeholder 5"/>
-          <p:cNvSpPr>
-            <a:spLocks noGrp="1"/>
-          </p:cNvSpPr>
-          <p:nvPr>
-            <p:ph type="sldNum" sz="quarter" idx="12"/>
-          </p:nvPr>
-        </p:nvSpPr>
-        <p:spPr/>
-        <p:txBody>
-          <a:bodyPr/>
-          <a:lstStyle/>
-          <a:p>
-            <a:fld id="{D57F1E4F-1CFF-5643-939E-02111984F565}" type="slidenum">
-              <a:rPr lang="en-US" smtClean="0"/>
-              <a:t>6</a:t>
-            </a:fld>
-            <a:endParaRPr lang="en-US" dirty="0"/>
-          </a:p>
-        </p:txBody>
-      </p:sp>
-    </p:spTree>
-    <p:extLst>
-      <p:ext uri="{BB962C8B-B14F-4D97-AF65-F5344CB8AC3E}">
-        <p14:creationId xmlns:p14="http://schemas.microsoft.com/office/powerpoint/2010/main" val="1729102366"/>
-      </p:ext>
-    </p:extLst>
-  </p:cSld>
-  <p:clrMapOvr>
-    <a:masterClrMapping/>
-  </p:clrMapOvr>
-  <p:timing>
-    <p:tnLst>
-      <p:par>
-        <p:cTn id="1" dur="indefinite" restart="never" nodeType="tmRoot"/>
-      </p:par>
-    </p:tnLst>
-  </p:timing>
-</p:sld>
-</file>
-
-<file path=ppt/slides/slide7.xml><?xml version="1.0" encoding="utf-8"?>
-<p:sld xmlns:a="http://schemas.openxmlformats.org/drawingml/2006/main" xmlns:r="http://schemas.openxmlformats.org/officeDocument/2006/relationships" xmlns:p="http://schemas.openxmlformats.org/presentationml/2006/main">
-  <p:cSld>
-    <p:spTree>
-      <p:nvGrpSpPr>
-        <p:cNvPr id="1" name=""/>
-        <p:cNvGrpSpPr/>
-        <p:nvPr/>
-      </p:nvGrpSpPr>
-      <p:grpSpPr>
-        <a:xfrm>
-          <a:off x="0" y="0"/>
-          <a:ext cx="0" cy="0"/>
-          <a:chOff x="0" y="0"/>
-          <a:chExt cx="0" cy="0"/>
-        </a:xfrm>
-      </p:grpSpPr>
-      <p:sp>
-        <p:nvSpPr>
           <p:cNvPr id="2" name="Title 1"/>
           <p:cNvSpPr>
             <a:spLocks noGrp="1"/>
@@ -7423,7 +7215,7 @@
           <a:p>
             <a:fld id="{D57F1E4F-1CFF-5643-939E-02111984F565}" type="slidenum">
               <a:rPr lang="en-US" smtClean="0"/>
-              <a:t>7</a:t>
+              <a:t>6</a:t>
             </a:fld>
             <a:endParaRPr lang="en-US" dirty="0"/>
           </a:p>
@@ -7499,7 +7291,7 @@
 </p:sld>
 </file>
 
-<file path=ppt/slides/slide8.xml><?xml version="1.0" encoding="utf-8"?>
+<file path=ppt/slides/slide7.xml><?xml version="1.0" encoding="utf-8"?>
 <p:sld xmlns:a="http://schemas.openxmlformats.org/drawingml/2006/main" xmlns:r="http://schemas.openxmlformats.org/officeDocument/2006/relationships" xmlns:p="http://schemas.openxmlformats.org/presentationml/2006/main">
   <p:cSld>
     <p:spTree>
@@ -7633,7 +7425,7 @@
           <a:p>
             <a:fld id="{D57F1E4F-1CFF-5643-939E-02111984F565}" type="slidenum">
               <a:rPr lang="en-US" smtClean="0"/>
-              <a:t>8</a:t>
+              <a:t>7</a:t>
             </a:fld>
             <a:endParaRPr lang="en-US" dirty="0"/>
           </a:p>
@@ -7659,7 +7451,7 @@
 </p:sld>
 </file>
 
-<file path=ppt/slides/slide9.xml><?xml version="1.0" encoding="utf-8"?>
+<file path=ppt/slides/slide8.xml><?xml version="1.0" encoding="utf-8"?>
 <p:sld xmlns:a="http://schemas.openxmlformats.org/drawingml/2006/main" xmlns:r="http://schemas.openxmlformats.org/officeDocument/2006/relationships" xmlns:p="http://schemas.openxmlformats.org/presentationml/2006/main">
   <p:cSld>
     <p:spTree>
@@ -7737,7 +7529,6 @@
               <a:rPr lang="nl-NL" dirty="0" smtClean="0"/>
               <a:t>GitHub</a:t>
             </a:r>
-            <a:endParaRPr lang="nl-NL" dirty="0" smtClean="0"/>
           </a:p>
           <a:p>
             <a:pPr lvl="1"/>
@@ -7745,7 +7536,6 @@
               <a:rPr lang="nl-NL" dirty="0" smtClean="0"/>
               <a:t>Deadlines</a:t>
             </a:r>
-            <a:endParaRPr lang="nl-NL" dirty="0" smtClean="0"/>
           </a:p>
         </p:txBody>
       </p:sp>
@@ -7766,7 +7556,7 @@
           <a:p>
             <a:fld id="{D57F1E4F-1CFF-5643-939E-02111984F565}" type="slidenum">
               <a:rPr lang="en-US" smtClean="0"/>
-              <a:t>9</a:t>
+              <a:t>8</a:t>
             </a:fld>
             <a:endParaRPr lang="en-US" dirty="0"/>
           </a:p>
@@ -8032,7 +7822,6 @@
               <a:rPr lang="nl-NL" dirty="0" smtClean="0"/>
               <a:t>Focus</a:t>
             </a:r>
-            <a:endParaRPr lang="nl-NL" dirty="0" smtClean="0"/>
           </a:p>
           <a:p>
             <a:pPr lvl="1"/>
@@ -8040,7 +7829,6 @@
               <a:rPr lang="nl-NL" dirty="0" smtClean="0"/>
               <a:t>Planning</a:t>
             </a:r>
-            <a:endParaRPr lang="nl-NL" dirty="0" smtClean="0"/>
           </a:p>
           <a:p>
             <a:pPr lvl="1"/>
@@ -8048,7 +7836,6 @@
               <a:rPr lang="nl-NL" dirty="0" smtClean="0"/>
               <a:t>Review</a:t>
             </a:r>
-            <a:endParaRPr lang="nl-NL" dirty="0" smtClean="0"/>
           </a:p>
         </p:txBody>
       </p:sp>
@@ -8056,6 +7843,113 @@
     <p:extLst>
       <p:ext uri="{BB962C8B-B14F-4D97-AF65-F5344CB8AC3E}">
         <p14:creationId xmlns:p14="http://schemas.microsoft.com/office/powerpoint/2010/main" val="2773319145"/>
+      </p:ext>
+    </p:extLst>
+  </p:cSld>
+  <p:clrMapOvr>
+    <a:masterClrMapping/>
+  </p:clrMapOvr>
+  <p:timing>
+    <p:tnLst>
+      <p:par>
+        <p:cTn id="1" dur="indefinite" restart="never" nodeType="tmRoot"/>
+      </p:par>
+    </p:tnLst>
+  </p:timing>
+</p:sld>
+</file>
+
+<file path=ppt/slides/slide9.xml><?xml version="1.0" encoding="utf-8"?>
+<p:sld xmlns:a="http://schemas.openxmlformats.org/drawingml/2006/main" xmlns:r="http://schemas.openxmlformats.org/officeDocument/2006/relationships" xmlns:p="http://schemas.openxmlformats.org/presentationml/2006/main">
+  <p:cSld>
+    <p:spTree>
+      <p:nvGrpSpPr>
+        <p:cNvPr id="1" name=""/>
+        <p:cNvGrpSpPr/>
+        <p:nvPr/>
+      </p:nvGrpSpPr>
+      <p:grpSpPr>
+        <a:xfrm>
+          <a:off x="0" y="0"/>
+          <a:ext cx="0" cy="0"/>
+          <a:chOff x="0" y="0"/>
+          <a:chExt cx="0" cy="0"/>
+        </a:xfrm>
+      </p:grpSpPr>
+      <p:sp>
+        <p:nvSpPr>
+          <p:cNvPr id="2" name="Title 1"/>
+          <p:cNvSpPr>
+            <a:spLocks noGrp="1"/>
+          </p:cNvSpPr>
+          <p:nvPr>
+            <p:ph type="title"/>
+          </p:nvPr>
+        </p:nvSpPr>
+        <p:spPr/>
+        <p:txBody>
+          <a:bodyPr/>
+          <a:lstStyle/>
+          <a:p>
+            <a:r>
+              <a:rPr lang="nl-NL" dirty="0" smtClean="0"/>
+              <a:t>CONCLUSIE</a:t>
+            </a:r>
+            <a:endParaRPr lang="nl-NL" dirty="0"/>
+          </a:p>
+        </p:txBody>
+      </p:sp>
+      <p:sp>
+        <p:nvSpPr>
+          <p:cNvPr id="7" name="Text Placeholder 6"/>
+          <p:cNvSpPr>
+            <a:spLocks noGrp="1"/>
+          </p:cNvSpPr>
+          <p:nvPr>
+            <p:ph type="body" sz="half" idx="2"/>
+          </p:nvPr>
+        </p:nvSpPr>
+        <p:spPr/>
+        <p:txBody>
+          <a:bodyPr>
+            <a:normAutofit/>
+          </a:bodyPr>
+          <a:lstStyle/>
+          <a:p>
+            <a:endParaRPr lang="nl-NL" sz="2400" i="1" dirty="0" smtClean="0"/>
+          </a:p>
+          <a:p>
+            <a:endParaRPr lang="nl-NL" sz="2400" i="1" dirty="0"/>
+          </a:p>
+        </p:txBody>
+      </p:sp>
+      <p:sp>
+        <p:nvSpPr>
+          <p:cNvPr id="4" name="Slide Number Placeholder 3"/>
+          <p:cNvSpPr>
+            <a:spLocks noGrp="1"/>
+          </p:cNvSpPr>
+          <p:nvPr>
+            <p:ph type="sldNum" sz="quarter" idx="12"/>
+          </p:nvPr>
+        </p:nvSpPr>
+        <p:spPr/>
+        <p:txBody>
+          <a:bodyPr/>
+          <a:lstStyle/>
+          <a:p>
+            <a:fld id="{D57F1E4F-1CFF-5643-939E-02111984F565}" type="slidenum">
+              <a:rPr lang="en-US" smtClean="0"/>
+              <a:t>9</a:t>
+            </a:fld>
+            <a:endParaRPr lang="en-US" dirty="0"/>
+          </a:p>
+        </p:txBody>
+      </p:sp>
+    </p:spTree>
+    <p:extLst>
+      <p:ext uri="{BB962C8B-B14F-4D97-AF65-F5344CB8AC3E}">
+        <p14:creationId xmlns:p14="http://schemas.microsoft.com/office/powerpoint/2010/main" val="3282580397"/>
       </p:ext>
     </p:extLst>
   </p:cSld>
@@ -8332,7 +8226,7 @@
   <a:extraClrSchemeLst/>
   <a:extLst>
     <a:ext uri="{05A4C25C-085E-4340-85A3-A5531E510DB2}">
-      <thm15:themeFamily xmlns="" xmlns:thm15="http://schemas.microsoft.com/office/thememl/2012/main" name="Ion" id="{B8441ADB-2E43-4AF7-B97A-BD870242C6A8}" vid="{292E63A9-BB86-4E3D-B92A-7223C6510D2E}"/>
+      <thm15:themeFamily xmlns:thm15="http://schemas.microsoft.com/office/thememl/2012/main" name="Ion" id="{B8441ADB-2E43-4AF7-B97A-BD870242C6A8}" vid="{292E63A9-BB86-4E3D-B92A-7223C6510D2E}"/>
     </a:ext>
   </a:extLst>
 </a:theme>
@@ -8593,7 +8487,7 @@
   <a:extraClrSchemeLst/>
   <a:extLst>
     <a:ext uri="{05A4C25C-085E-4340-85A3-A5531E510DB2}">
-      <thm15:themeFamily xmlns="" xmlns:thm15="http://schemas.microsoft.com/office/thememl/2012/main" name="Office Theme" id="{62F939B6-93AF-4DB8-9C6B-D6C7DFDC589F}" vid="{4A3C46E8-61CC-4603-A589-7422A47A8E4A}"/>
+      <thm15:themeFamily xmlns:thm15="http://schemas.microsoft.com/office/thememl/2012/main" name="Office Theme" id="{62F939B6-93AF-4DB8-9C6B-D6C7DFDC589F}" vid="{4A3C46E8-61CC-4603-A589-7422A47A8E4A}"/>
     </a:ext>
   </a:extLst>
 </a:theme>

</xml_diff>